<commit_message>
imagens alteradas diagrama classe
</commit_message>
<xml_diff>
--- a/PADRAO DE PROJETO_TDE.pptx
+++ b/PADRAO DE PROJETO_TDE.pptx
@@ -23582,7 +23582,7 @@
             <a:pPr rtl="0"/>
             <a:fld id="{A517C7B7-34F5-4531-9889-28687F60FAC8}" type="datetime1">
               <a:rPr lang="pt-BR" smtClean="0"/>
-              <a:t>23/04/2023</a:t>
+              <a:t>25/04/2023</a:t>
             </a:fld>
             <a:endParaRPr lang="pt-BR" dirty="0"/>
           </a:p>
@@ -23763,7 +23763,7 @@
             <a:fld id="{40C3EC75-555C-481D-9088-738CE6DDFC83}" type="datetime1">
               <a:rPr lang="pt-BR" smtClean="0"/>
               <a:pPr/>
-              <a:t>23/04/2023</a:t>
+              <a:t>25/04/2023</a:t>
             </a:fld>
             <a:endParaRPr lang="pt-BR" dirty="0"/>
           </a:p>
@@ -24186,7 +24186,7 @@
             <a:pPr rtl="0"/>
             <a:fld id="{C6B3AB32-59DF-41F1-9618-EDFBF5049629}" type="slidenum">
               <a:rPr lang="pt-BR" smtClean="0"/>
-              <a:t>9</a:t>
+              <a:t>10</a:t>
             </a:fld>
             <a:endParaRPr lang="pt-BR"/>
           </a:p>
@@ -24272,7 +24272,7 @@
             <a:pPr rtl="0"/>
             <a:fld id="{C6B3AB32-59DF-41F1-9618-EDFBF5049629}" type="slidenum">
               <a:rPr lang="pt-BR" smtClean="0"/>
-              <a:t>10</a:t>
+              <a:t>11</a:t>
             </a:fld>
             <a:endParaRPr lang="pt-BR"/>
           </a:p>
@@ -24358,7 +24358,7 @@
             <a:pPr rtl="0"/>
             <a:fld id="{C6B3AB32-59DF-41F1-9618-EDFBF5049629}" type="slidenum">
               <a:rPr lang="pt-BR" smtClean="0"/>
-              <a:t>11</a:t>
+              <a:t>12</a:t>
             </a:fld>
             <a:endParaRPr lang="pt-BR"/>
           </a:p>
@@ -24444,7 +24444,7 @@
             <a:pPr rtl="0"/>
             <a:fld id="{C6B3AB32-59DF-41F1-9618-EDFBF5049629}" type="slidenum">
               <a:rPr lang="pt-BR" smtClean="0"/>
-              <a:t>12</a:t>
+              <a:t>13</a:t>
             </a:fld>
             <a:endParaRPr lang="pt-BR"/>
           </a:p>
@@ -24530,7 +24530,7 @@
             <a:pPr rtl="0"/>
             <a:fld id="{C6B3AB32-59DF-41F1-9618-EDFBF5049629}" type="slidenum">
               <a:rPr lang="pt-BR" smtClean="0"/>
-              <a:t>13</a:t>
+              <a:t>14</a:t>
             </a:fld>
             <a:endParaRPr lang="pt-BR"/>
           </a:p>
@@ -24616,7 +24616,7 @@
             <a:pPr rtl="0"/>
             <a:fld id="{C6B3AB32-59DF-41F1-9618-EDFBF5049629}" type="slidenum">
               <a:rPr lang="pt-BR" smtClean="0"/>
-              <a:t>14</a:t>
+              <a:t>15</a:t>
             </a:fld>
             <a:endParaRPr lang="pt-BR"/>
           </a:p>
@@ -24702,7 +24702,7 @@
             <a:pPr rtl="0"/>
             <a:fld id="{C6B3AB32-59DF-41F1-9618-EDFBF5049629}" type="slidenum">
               <a:rPr lang="pt-BR" smtClean="0"/>
-              <a:t>15</a:t>
+              <a:t>16</a:t>
             </a:fld>
             <a:endParaRPr lang="pt-BR"/>
           </a:p>
@@ -24788,7 +24788,7 @@
             <a:pPr rtl="0"/>
             <a:fld id="{C6B3AB32-59DF-41F1-9618-EDFBF5049629}" type="slidenum">
               <a:rPr lang="pt-BR" smtClean="0"/>
-              <a:t>16</a:t>
+              <a:t>17</a:t>
             </a:fld>
             <a:endParaRPr lang="pt-BR"/>
           </a:p>
@@ -24874,7 +24874,7 @@
             <a:pPr rtl="0"/>
             <a:fld id="{C6B3AB32-59DF-41F1-9618-EDFBF5049629}" type="slidenum">
               <a:rPr lang="pt-BR" smtClean="0"/>
-              <a:t>17</a:t>
+              <a:t>18</a:t>
             </a:fld>
             <a:endParaRPr lang="pt-BR"/>
           </a:p>
@@ -24960,7 +24960,7 @@
             <a:pPr rtl="0"/>
             <a:fld id="{C6B3AB32-59DF-41F1-9618-EDFBF5049629}" type="slidenum">
               <a:rPr lang="pt-BR" smtClean="0"/>
-              <a:t>18</a:t>
+              <a:t>19</a:t>
             </a:fld>
             <a:endParaRPr lang="pt-BR"/>
           </a:p>
@@ -25132,7 +25132,7 @@
             <a:pPr rtl="0"/>
             <a:fld id="{C6B3AB32-59DF-41F1-9618-EDFBF5049629}" type="slidenum">
               <a:rPr lang="pt-BR" smtClean="0"/>
-              <a:t>19</a:t>
+              <a:t>20</a:t>
             </a:fld>
             <a:endParaRPr lang="pt-BR"/>
           </a:p>
@@ -25218,7 +25218,7 @@
             <a:pPr rtl="0"/>
             <a:fld id="{C6B3AB32-59DF-41F1-9618-EDFBF5049629}" type="slidenum">
               <a:rPr lang="pt-BR" smtClean="0"/>
-              <a:t>20</a:t>
+              <a:t>21</a:t>
             </a:fld>
             <a:endParaRPr lang="pt-BR"/>
           </a:p>
@@ -25304,7 +25304,7 @@
             <a:pPr rtl="0"/>
             <a:fld id="{C6B3AB32-59DF-41F1-9618-EDFBF5049629}" type="slidenum">
               <a:rPr lang="pt-BR" smtClean="0"/>
-              <a:t>33</a:t>
+              <a:t>34</a:t>
             </a:fld>
             <a:endParaRPr lang="pt-BR"/>
           </a:p>
@@ -25390,7 +25390,7 @@
             <a:pPr rtl="0"/>
             <a:fld id="{C6B3AB32-59DF-41F1-9618-EDFBF5049629}" type="slidenum">
               <a:rPr lang="pt-BR" smtClean="0"/>
-              <a:t>34</a:t>
+              <a:t>35</a:t>
             </a:fld>
             <a:endParaRPr lang="pt-BR"/>
           </a:p>
@@ -25562,7 +25562,7 @@
             <a:pPr rtl="0"/>
             <a:fld id="{C6B3AB32-59DF-41F1-9618-EDFBF5049629}" type="slidenum">
               <a:rPr lang="pt-BR" smtClean="0"/>
-              <a:t>3</a:t>
+              <a:t>4</a:t>
             </a:fld>
             <a:endParaRPr lang="pt-BR"/>
           </a:p>
@@ -25648,7 +25648,7 @@
             <a:pPr rtl="0"/>
             <a:fld id="{C6B3AB32-59DF-41F1-9618-EDFBF5049629}" type="slidenum">
               <a:rPr lang="pt-BR" smtClean="0"/>
-              <a:t>4</a:t>
+              <a:t>5</a:t>
             </a:fld>
             <a:endParaRPr lang="pt-BR"/>
           </a:p>
@@ -25734,7 +25734,7 @@
             <a:pPr rtl="0"/>
             <a:fld id="{C6B3AB32-59DF-41F1-9618-EDFBF5049629}" type="slidenum">
               <a:rPr lang="pt-BR" smtClean="0"/>
-              <a:t>5</a:t>
+              <a:t>6</a:t>
             </a:fld>
             <a:endParaRPr lang="pt-BR"/>
           </a:p>
@@ -25820,7 +25820,7 @@
             <a:pPr rtl="0"/>
             <a:fld id="{C6B3AB32-59DF-41F1-9618-EDFBF5049629}" type="slidenum">
               <a:rPr lang="pt-BR" smtClean="0"/>
-              <a:t>6</a:t>
+              <a:t>7</a:t>
             </a:fld>
             <a:endParaRPr lang="pt-BR"/>
           </a:p>
@@ -25906,7 +25906,7 @@
             <a:pPr rtl="0"/>
             <a:fld id="{C6B3AB32-59DF-41F1-9618-EDFBF5049629}" type="slidenum">
               <a:rPr lang="pt-BR" smtClean="0"/>
-              <a:t>7</a:t>
+              <a:t>8</a:t>
             </a:fld>
             <a:endParaRPr lang="pt-BR"/>
           </a:p>
@@ -25992,7 +25992,7 @@
             <a:pPr rtl="0"/>
             <a:fld id="{C6B3AB32-59DF-41F1-9618-EDFBF5049629}" type="slidenum">
               <a:rPr lang="pt-BR" smtClean="0"/>
-              <a:t>8</a:t>
+              <a:t>9</a:t>
             </a:fld>
             <a:endParaRPr lang="pt-BR"/>
           </a:p>
@@ -26257,7 +26257,7 @@
             <a:pPr rtl="0"/>
             <a:fld id="{2AF5B136-74F1-42D3-987D-A097EEF8F2FE}" type="datetime1">
               <a:rPr lang="pt-BR" noProof="0" smtClean="0"/>
-              <a:t>23/04/2023</a:t>
+              <a:t>25/04/2023</a:t>
             </a:fld>
             <a:endParaRPr lang="pt-BR" noProof="0"/>
           </a:p>
@@ -26522,7 +26522,7 @@
             <a:pPr rtl="0"/>
             <a:fld id="{0229B074-15EB-43FB-8347-3A734D799093}" type="datetime1">
               <a:rPr lang="pt-BR" noProof="0" smtClean="0"/>
-              <a:t>23/04/2023</a:t>
+              <a:t>25/04/2023</a:t>
             </a:fld>
             <a:endParaRPr lang="pt-BR" noProof="0"/>
           </a:p>
@@ -26760,7 +26760,7 @@
             <a:pPr rtl="0"/>
             <a:fld id="{036303E3-8DE9-4C2D-91EE-6F377AE582A8}" type="datetime1">
               <a:rPr lang="pt-BR" noProof="0" smtClean="0"/>
-              <a:t>23/04/2023</a:t>
+              <a:t>25/04/2023</a:t>
             </a:fld>
             <a:endParaRPr lang="pt-BR" noProof="0"/>
           </a:p>
@@ -27003,7 +27003,7 @@
             <a:pPr rtl="0"/>
             <a:fld id="{B04AF3F4-81C7-4F15-8991-6D0E8D06651A}" type="datetime1">
               <a:rPr lang="pt-BR" noProof="0" smtClean="0"/>
-              <a:t>23/04/2023</a:t>
+              <a:t>25/04/2023</a:t>
             </a:fld>
             <a:endParaRPr lang="pt-BR" noProof="0"/>
           </a:p>
@@ -27314,7 +27314,7 @@
             <a:pPr rtl="0"/>
             <a:fld id="{6E2946E4-8964-43BF-B1D5-4261B83248E5}" type="datetime1">
               <a:rPr lang="pt-BR" noProof="0" smtClean="0"/>
-              <a:t>23/04/2023</a:t>
+              <a:t>25/04/2023</a:t>
             </a:fld>
             <a:endParaRPr lang="pt-BR" noProof="0"/>
           </a:p>
@@ -27618,7 +27618,7 @@
             <a:pPr rtl="0"/>
             <a:fld id="{97C9F420-083C-437A-9265-7F13EB97C6A2}" type="datetime1">
               <a:rPr lang="pt-BR" noProof="0" smtClean="0"/>
-              <a:t>23/04/2023</a:t>
+              <a:t>25/04/2023</a:t>
             </a:fld>
             <a:endParaRPr lang="pt-BR" noProof="0"/>
           </a:p>
@@ -28042,7 +28042,7 @@
             <a:pPr rtl="0"/>
             <a:fld id="{BE07AF20-ED70-4B21-B799-75BB5818AB43}" type="datetime1">
               <a:rPr lang="pt-BR" noProof="0" smtClean="0"/>
-              <a:t>23/04/2023</a:t>
+              <a:t>25/04/2023</a:t>
             </a:fld>
             <a:endParaRPr lang="pt-BR" noProof="0"/>
           </a:p>
@@ -28141,7 +28141,7 @@
             <a:pPr rtl="0"/>
             <a:fld id="{0D33D876-8C34-42FC-BFF7-457557B97BB7}" type="datetime1">
               <a:rPr lang="pt-BR" noProof="0" smtClean="0"/>
-              <a:t>23/04/2023</a:t>
+              <a:t>25/04/2023</a:t>
             </a:fld>
             <a:endParaRPr lang="pt-BR" noProof="0"/>
           </a:p>
@@ -28307,7 +28307,7 @@
             <a:pPr rtl="0"/>
             <a:fld id="{4592437E-206F-4A1C-947F-806A50A40B88}" type="datetime1">
               <a:rPr lang="pt-BR" noProof="0" smtClean="0"/>
-              <a:t>23/04/2023</a:t>
+              <a:t>25/04/2023</a:t>
             </a:fld>
             <a:endParaRPr lang="pt-BR" noProof="0"/>
           </a:p>
@@ -28688,7 +28688,7 @@
             <a:pPr rtl="0"/>
             <a:fld id="{B036DDBC-F1EF-4D09-A533-5995BC167053}" type="datetime1">
               <a:rPr lang="pt-BR" noProof="0" smtClean="0"/>
-              <a:t>23/04/2023</a:t>
+              <a:t>25/04/2023</a:t>
             </a:fld>
             <a:endParaRPr lang="pt-BR" noProof="0"/>
           </a:p>
@@ -28981,7 +28981,7 @@
             <a:pPr rtl="0"/>
             <a:fld id="{DFFDDC01-A1CF-4C3A-BE96-FBC60101324D}" type="datetime1">
               <a:rPr lang="pt-BR" noProof="0" smtClean="0"/>
-              <a:t>23/04/2023</a:t>
+              <a:t>25/04/2023</a:t>
             </a:fld>
             <a:endParaRPr lang="pt-BR" noProof="0"/>
           </a:p>
@@ -29195,7 +29195,7 @@
             <a:pPr rtl="0"/>
             <a:fld id="{52266794-2CD5-4ED3-94F8-8B8DC65FDDE3}" type="datetime1">
               <a:rPr lang="pt-BR" noProof="0" smtClean="0"/>
-              <a:t>23/04/2023</a:t>
+              <a:t>25/04/2023</a:t>
             </a:fld>
             <a:endParaRPr lang="pt-BR" noProof="0"/>
           </a:p>
@@ -30136,7 +30136,7 @@
       </p:sp>
       <p:pic>
         <p:nvPicPr>
-          <p:cNvPr id="5" name="Espaço Reservado para Conteúdo 4" descr="Tela de computador com texto preto sobre fundo branco">
+          <p:cNvPr id="5" name="Espaço Reservado para Conteúdo 4">
             <a:extLst>
               <a:ext uri="{FF2B5EF4-FFF2-40B4-BE49-F238E27FC236}">
                 <a16:creationId xmlns:a16="http://schemas.microsoft.com/office/drawing/2014/main" id="{244738B4-CDB7-521F-5166-203C07473EE5}"/>
@@ -30152,9 +30152,8 @@
         </p:nvPicPr>
         <p:blipFill>
           <a:blip r:embed="rId3"/>
-          <a:stretch>
-            <a:fillRect/>
-          </a:stretch>
+          <a:srcRect/>
+          <a:stretch/>
         </p:blipFill>
         <p:spPr>
           <a:xfrm>
@@ -30386,7 +30385,7 @@
       </p:sp>
       <p:pic>
         <p:nvPicPr>
-          <p:cNvPr id="7" name="Espaço Reservado para Conteúdo 6" descr="projeto em java com padrão de projeto façade">
+          <p:cNvPr id="7" name="Espaço Reservado para Conteúdo 6">
             <a:extLst>
               <a:ext uri="{FF2B5EF4-FFF2-40B4-BE49-F238E27FC236}">
                 <a16:creationId xmlns:a16="http://schemas.microsoft.com/office/drawing/2014/main" id="{D1DA1BF3-1AE3-1EFE-F566-456BB2D527B4}"/>
@@ -30402,9 +30401,8 @@
         </p:nvPicPr>
         <p:blipFill>
           <a:blip r:embed="rId3"/>
-          <a:stretch>
-            <a:fillRect/>
-          </a:stretch>
+          <a:srcRect/>
+          <a:stretch/>
         </p:blipFill>
         <p:spPr>
           <a:xfrm>
@@ -33597,7 +33595,7 @@
       </p:sp>
       <p:pic>
         <p:nvPicPr>
-          <p:cNvPr id="5" name="Imagem 4" descr="Diagrama&#10;&#10;Descrição gerada automaticamente">
+          <p:cNvPr id="5" name="Imagem 4">
             <a:extLst>
               <a:ext uri="{FF2B5EF4-FFF2-40B4-BE49-F238E27FC236}">
                 <a16:creationId xmlns:a16="http://schemas.microsoft.com/office/drawing/2014/main" id="{37FDA165-FAD8-2D0C-D087-F761B98C9ADD}"/>
@@ -33611,14 +33609,13 @@
         </p:nvPicPr>
         <p:blipFill>
           <a:blip r:embed="rId2"/>
-          <a:stretch>
-            <a:fillRect/>
-          </a:stretch>
+          <a:srcRect/>
+          <a:stretch/>
         </p:blipFill>
         <p:spPr>
           <a:xfrm>
-            <a:off x="3723736" y="1841806"/>
-            <a:ext cx="4744528" cy="5016194"/>
+            <a:off x="3543300" y="1965444"/>
+            <a:ext cx="6534149" cy="4789833"/>
           </a:xfrm>
           <a:prstGeom prst="rect">
             <a:avLst/>
@@ -33693,7 +33690,7 @@
       </p:sp>
       <p:pic>
         <p:nvPicPr>
-          <p:cNvPr id="4" name="Imagem 3" descr="Diagrama&#10;&#10;Descrição gerada automaticamente">
+          <p:cNvPr id="4" name="Imagem 3">
             <a:extLst>
               <a:ext uri="{FF2B5EF4-FFF2-40B4-BE49-F238E27FC236}">
                 <a16:creationId xmlns:a16="http://schemas.microsoft.com/office/drawing/2014/main" id="{85C0C7EA-CF4F-93BC-1B58-DB06E0D2B046}"/>
@@ -33707,14 +33704,13 @@
         </p:nvPicPr>
         <p:blipFill>
           <a:blip r:embed="rId2"/>
-          <a:stretch>
-            <a:fillRect/>
-          </a:stretch>
+          <a:srcRect/>
+          <a:stretch/>
         </p:blipFill>
         <p:spPr>
           <a:xfrm>
-            <a:off x="1671020" y="1846053"/>
-            <a:ext cx="8849960" cy="5011947"/>
+            <a:off x="2325379" y="1846053"/>
+            <a:ext cx="7731741" cy="5011947"/>
           </a:xfrm>
           <a:prstGeom prst="rect">
             <a:avLst/>

</xml_diff>

<commit_message>
atualização do diagrama de classe solução gateway depois da apresentação
</commit_message>
<xml_diff>
--- a/PADRAO DE PROJETO_TDE.pptx
+++ b/PADRAO DE PROJETO_TDE.pptx
@@ -32965,6 +32965,36 @@
           </a:p>
         </p:txBody>
       </p:sp>
+      <p:pic>
+        <p:nvPicPr>
+          <p:cNvPr id="3" name="Imagem 2">
+            <a:extLst>
+              <a:ext uri="{FF2B5EF4-FFF2-40B4-BE49-F238E27FC236}">
+                <a16:creationId xmlns:a16="http://schemas.microsoft.com/office/drawing/2014/main" id="{AEF62F4A-4CD9-48FE-BCD1-00AD3832D8F2}"/>
+              </a:ext>
+            </a:extLst>
+          </p:cNvPr>
+          <p:cNvPicPr>
+            <a:picLocks noChangeAspect="1"/>
+          </p:cNvPicPr>
+          <p:nvPr/>
+        </p:nvPicPr>
+        <p:blipFill>
+          <a:blip r:embed="rId5"/>
+          <a:stretch>
+            <a:fillRect/>
+          </a:stretch>
+        </p:blipFill>
+        <p:spPr>
+          <a:xfrm>
+            <a:off x="6256287" y="4147481"/>
+            <a:ext cx="2900752" cy="667799"/>
+          </a:xfrm>
+          <a:prstGeom prst="rect">
+            <a:avLst/>
+          </a:prstGeom>
+        </p:spPr>
+      </p:pic>
     </p:spTree>
     <p:extLst>
       <p:ext uri="{BB962C8B-B14F-4D97-AF65-F5344CB8AC3E}">
@@ -33709,8 +33739,8 @@
         </p:blipFill>
         <p:spPr>
           <a:xfrm>
-            <a:off x="2325379" y="1846053"/>
-            <a:ext cx="7731741" cy="5011947"/>
+            <a:off x="2966936" y="1799617"/>
+            <a:ext cx="6283705" cy="5058384"/>
           </a:xfrm>
           <a:prstGeom prst="rect">
             <a:avLst/>
@@ -36197,6 +36227,126 @@
           <a:xfrm>
             <a:off x="0" y="2200881"/>
             <a:ext cx="12192000" cy="4656514"/>
+          </a:xfrm>
+          <a:prstGeom prst="rect">
+            <a:avLst/>
+          </a:prstGeom>
+        </p:spPr>
+      </p:pic>
+      <p:pic>
+        <p:nvPicPr>
+          <p:cNvPr id="2" name="Imagem 1">
+            <a:extLst>
+              <a:ext uri="{FF2B5EF4-FFF2-40B4-BE49-F238E27FC236}">
+                <a16:creationId xmlns:a16="http://schemas.microsoft.com/office/drawing/2014/main" id="{3D3E07D2-E9DE-4105-A191-0EE3A15E0CAC}"/>
+              </a:ext>
+            </a:extLst>
+          </p:cNvPr>
+          <p:cNvPicPr>
+            <a:picLocks noChangeAspect="1"/>
+          </p:cNvPicPr>
+          <p:nvPr/>
+        </p:nvPicPr>
+        <p:blipFill>
+          <a:blip r:embed="rId5"/>
+          <a:stretch>
+            <a:fillRect/>
+          </a:stretch>
+        </p:blipFill>
+        <p:spPr>
+          <a:xfrm>
+            <a:off x="3915605" y="3677613"/>
+            <a:ext cx="2317415" cy="533506"/>
+          </a:xfrm>
+          <a:prstGeom prst="rect">
+            <a:avLst/>
+          </a:prstGeom>
+        </p:spPr>
+      </p:pic>
+      <p:pic>
+        <p:nvPicPr>
+          <p:cNvPr id="5" name="Imagem 4">
+            <a:extLst>
+              <a:ext uri="{FF2B5EF4-FFF2-40B4-BE49-F238E27FC236}">
+                <a16:creationId xmlns:a16="http://schemas.microsoft.com/office/drawing/2014/main" id="{9F376377-954F-4D84-9DE8-53BB117C7F95}"/>
+              </a:ext>
+            </a:extLst>
+          </p:cNvPr>
+          <p:cNvPicPr>
+            <a:picLocks noChangeAspect="1"/>
+          </p:cNvPicPr>
+          <p:nvPr/>
+        </p:nvPicPr>
+        <p:blipFill>
+          <a:blip r:embed="rId5"/>
+          <a:stretch>
+            <a:fillRect/>
+          </a:stretch>
+        </p:blipFill>
+        <p:spPr>
+          <a:xfrm>
+            <a:off x="8815881" y="3877549"/>
+            <a:ext cx="2317412" cy="533505"/>
+          </a:xfrm>
+          <a:prstGeom prst="rect">
+            <a:avLst/>
+          </a:prstGeom>
+        </p:spPr>
+      </p:pic>
+      <p:pic>
+        <p:nvPicPr>
+          <p:cNvPr id="6" name="Imagem 5">
+            <a:extLst>
+              <a:ext uri="{FF2B5EF4-FFF2-40B4-BE49-F238E27FC236}">
+                <a16:creationId xmlns:a16="http://schemas.microsoft.com/office/drawing/2014/main" id="{1607260D-E8A0-4324-9DD5-F3848ADAF403}"/>
+              </a:ext>
+            </a:extLst>
+          </p:cNvPr>
+          <p:cNvPicPr>
+            <a:picLocks noChangeAspect="1"/>
+          </p:cNvPicPr>
+          <p:nvPr/>
+        </p:nvPicPr>
+        <p:blipFill>
+          <a:blip r:embed="rId6"/>
+          <a:stretch>
+            <a:fillRect/>
+          </a:stretch>
+        </p:blipFill>
+        <p:spPr>
+          <a:xfrm>
+            <a:off x="6710317" y="5281301"/>
+            <a:ext cx="1239961" cy="381489"/>
+          </a:xfrm>
+          <a:prstGeom prst="rect">
+            <a:avLst/>
+          </a:prstGeom>
+        </p:spPr>
+      </p:pic>
+      <p:pic>
+        <p:nvPicPr>
+          <p:cNvPr id="14" name="Imagem 13">
+            <a:extLst>
+              <a:ext uri="{FF2B5EF4-FFF2-40B4-BE49-F238E27FC236}">
+                <a16:creationId xmlns:a16="http://schemas.microsoft.com/office/drawing/2014/main" id="{8FA00C2E-97E2-4DF7-BBAD-E2FA6B460739}"/>
+              </a:ext>
+            </a:extLst>
+          </p:cNvPr>
+          <p:cNvPicPr>
+            <a:picLocks noChangeAspect="1"/>
+          </p:cNvPicPr>
+          <p:nvPr/>
+        </p:nvPicPr>
+        <p:blipFill>
+          <a:blip r:embed="rId7"/>
+          <a:stretch>
+            <a:fillRect/>
+          </a:stretch>
+        </p:blipFill>
+        <p:spPr>
+          <a:xfrm>
+            <a:off x="6624335" y="5344769"/>
+            <a:ext cx="1622357" cy="781050"/>
           </a:xfrm>
           <a:prstGeom prst="rect">
             <a:avLst/>

</xml_diff>